<commit_message>
add clustering images to poster
</commit_message>
<xml_diff>
--- a/Poster.pptx
+++ b/Poster.pptx
@@ -288,7 +288,7 @@
           <a:p>
             <a:fld id="{3228AFC0-98A4-1C4D-BE3A-0DB27C21F4C5}" type="datetimeFigureOut">
               <a:rPr lang="en-US" smtClean="0"/>
-              <a:t>12/6/15</a:t>
+              <a:t>12/7/15</a:t>
             </a:fld>
             <a:endParaRPr lang="en-US"/>
           </a:p>
@@ -458,7 +458,7 @@
           <a:p>
             <a:fld id="{3228AFC0-98A4-1C4D-BE3A-0DB27C21F4C5}" type="datetimeFigureOut">
               <a:rPr lang="en-US" smtClean="0"/>
-              <a:t>12/6/15</a:t>
+              <a:t>12/7/15</a:t>
             </a:fld>
             <a:endParaRPr lang="en-US"/>
           </a:p>
@@ -638,7 +638,7 @@
           <a:p>
             <a:fld id="{3228AFC0-98A4-1C4D-BE3A-0DB27C21F4C5}" type="datetimeFigureOut">
               <a:rPr lang="en-US" smtClean="0"/>
-              <a:t>12/6/15</a:t>
+              <a:t>12/7/15</a:t>
             </a:fld>
             <a:endParaRPr lang="en-US"/>
           </a:p>
@@ -808,7 +808,7 @@
           <a:p>
             <a:fld id="{3228AFC0-98A4-1C4D-BE3A-0DB27C21F4C5}" type="datetimeFigureOut">
               <a:rPr lang="en-US" smtClean="0"/>
-              <a:t>12/6/15</a:t>
+              <a:t>12/7/15</a:t>
             </a:fld>
             <a:endParaRPr lang="en-US"/>
           </a:p>
@@ -1054,7 +1054,7 @@
           <a:p>
             <a:fld id="{3228AFC0-98A4-1C4D-BE3A-0DB27C21F4C5}" type="datetimeFigureOut">
               <a:rPr lang="en-US" smtClean="0"/>
-              <a:t>12/6/15</a:t>
+              <a:t>12/7/15</a:t>
             </a:fld>
             <a:endParaRPr lang="en-US"/>
           </a:p>
@@ -1342,7 +1342,7 @@
           <a:p>
             <a:fld id="{3228AFC0-98A4-1C4D-BE3A-0DB27C21F4C5}" type="datetimeFigureOut">
               <a:rPr lang="en-US" smtClean="0"/>
-              <a:t>12/6/15</a:t>
+              <a:t>12/7/15</a:t>
             </a:fld>
             <a:endParaRPr lang="en-US"/>
           </a:p>
@@ -1769,7 +1769,7 @@
           <a:p>
             <a:fld id="{3228AFC0-98A4-1C4D-BE3A-0DB27C21F4C5}" type="datetimeFigureOut">
               <a:rPr lang="en-US" smtClean="0"/>
-              <a:t>12/6/15</a:t>
+              <a:t>12/7/15</a:t>
             </a:fld>
             <a:endParaRPr lang="en-US"/>
           </a:p>
@@ -1887,7 +1887,7 @@
           <a:p>
             <a:fld id="{3228AFC0-98A4-1C4D-BE3A-0DB27C21F4C5}" type="datetimeFigureOut">
               <a:rPr lang="en-US" smtClean="0"/>
-              <a:t>12/6/15</a:t>
+              <a:t>12/7/15</a:t>
             </a:fld>
             <a:endParaRPr lang="en-US"/>
           </a:p>
@@ -1982,7 +1982,7 @@
           <a:p>
             <a:fld id="{3228AFC0-98A4-1C4D-BE3A-0DB27C21F4C5}" type="datetimeFigureOut">
               <a:rPr lang="en-US" smtClean="0"/>
-              <a:t>12/6/15</a:t>
+              <a:t>12/7/15</a:t>
             </a:fld>
             <a:endParaRPr lang="en-US"/>
           </a:p>
@@ -2259,7 +2259,7 @@
           <a:p>
             <a:fld id="{3228AFC0-98A4-1C4D-BE3A-0DB27C21F4C5}" type="datetimeFigureOut">
               <a:rPr lang="en-US" smtClean="0"/>
-              <a:t>12/6/15</a:t>
+              <a:t>12/7/15</a:t>
             </a:fld>
             <a:endParaRPr lang="en-US"/>
           </a:p>
@@ -2512,7 +2512,7 @@
           <a:p>
             <a:fld id="{3228AFC0-98A4-1C4D-BE3A-0DB27C21F4C5}" type="datetimeFigureOut">
               <a:rPr lang="en-US" smtClean="0"/>
-              <a:t>12/6/15</a:t>
+              <a:t>12/7/15</a:t>
             </a:fld>
             <a:endParaRPr lang="en-US"/>
           </a:p>
@@ -2725,7 +2725,7 @@
           <a:p>
             <a:fld id="{3228AFC0-98A4-1C4D-BE3A-0DB27C21F4C5}" type="datetimeFigureOut">
               <a:rPr lang="en-US" smtClean="0"/>
-              <a:t>12/6/15</a:t>
+              <a:t>12/7/15</a:t>
             </a:fld>
             <a:endParaRPr lang="en-US"/>
           </a:p>
@@ -3399,20 +3399,9 @@
             <a:endParaRPr lang="en-US" sz="3000" dirty="0" smtClean="0"/>
           </a:p>
           <a:p>
-            <a:pPr marL="685800" indent="-685800">
-              <a:buFont typeface="Arial"/>
-              <a:buChar char="•"/>
-            </a:pPr>
-            <a:r>
-              <a:rPr lang="en-US" sz="3000" dirty="0" smtClean="0"/>
-              <a:t>TODO One very nice graph.</a:t>
-            </a:r>
-          </a:p>
-          <a:p>
-            <a:pPr marL="685800" indent="-685800">
-              <a:buFont typeface="Arial"/>
-              <a:buChar char="•"/>
-            </a:pPr>
+            <a:endParaRPr lang="en-US" sz="3000" dirty="0" smtClean="0"/>
+          </a:p>
+          <a:p>
             <a:endParaRPr lang="en-US" sz="3000" dirty="0"/>
           </a:p>
           <a:p>
@@ -3520,7 +3509,6 @@
               <a:rPr lang="en-US" sz="3000" dirty="0" smtClean="0"/>
               <a:t> sites’ generic user-specific reputation scores.</a:t>
             </a:r>
-            <a:endParaRPr lang="en-US" sz="3000" dirty="0" smtClean="0"/>
           </a:p>
         </p:txBody>
       </p:sp>
@@ -3533,6 +3521,63 @@
         <p:spPr>
           <a:xfrm>
             <a:off x="10949202" y="11242387"/>
+            <a:ext cx="10501419" cy="3908762"/>
+          </a:xfrm>
+          <a:prstGeom prst="rect">
+            <a:avLst/>
+          </a:prstGeom>
+        </p:spPr>
+        <p:txBody>
+          <a:bodyPr wrap="square">
+            <a:spAutoFit/>
+          </a:bodyPr>
+          <a:lstStyle/>
+          <a:p>
+            <a:pPr algn="ctr"/>
+            <a:r>
+              <a:rPr lang="en-US" sz="3800" dirty="0" smtClean="0"/>
+              <a:t>3.2. </a:t>
+            </a:r>
+            <a:r>
+              <a:rPr lang="en-US" sz="3800" dirty="0" smtClean="0"/>
+              <a:t>Clustering</a:t>
+            </a:r>
+          </a:p>
+          <a:p>
+            <a:pPr algn="ctr"/>
+            <a:r>
+              <a:rPr lang="en-US" sz="3000" dirty="0" smtClean="0"/>
+              <a:t>In order to identify particular network traits to different personas of people in </a:t>
+            </a:r>
+            <a:r>
+              <a:rPr lang="en-US" sz="3000" dirty="0" err="1" smtClean="0"/>
+              <a:t>StackOverflow</a:t>
+            </a:r>
+            <a:r>
+              <a:rPr lang="en-US" sz="3000" dirty="0" smtClean="0"/>
+              <a:t>, </a:t>
+            </a:r>
+            <a:r>
+              <a:rPr lang="en-US" sz="3000" i="1" dirty="0" smtClean="0"/>
+              <a:t>k-</a:t>
+            </a:r>
+            <a:r>
+              <a:rPr lang="en-US" sz="3000" dirty="0" smtClean="0"/>
+              <a:t>means clustering was done using the following features: views, down votes, up votes, out degree, in degree, closeness centrality, eigenvector centrality, and PageRank centrality. Given the silhouette values of 0.973 for 2 clusters, 0.959 for 3 cluster, 0.911 for 4 clusters, and 0.887 for 5 clusters, the peak clustering number is at 2 clusters. </a:t>
+            </a:r>
+            <a:endParaRPr lang="en-US" sz="3000" dirty="0" smtClean="0"/>
+          </a:p>
+        </p:txBody>
+      </p:sp>
+      <p:sp>
+        <p:nvSpPr>
+          <p:cNvPr id="12" name="Rectangle 11"/>
+          <p:cNvSpPr/>
+          <p:nvPr/>
+        </p:nvSpPr>
+        <p:spPr>
+          <a:xfrm>
+            <a:off x="447783" y="20043513"/>
             <a:ext cx="10501419" cy="3447098"/>
           </a:xfrm>
           <a:prstGeom prst="rect">
@@ -3548,7 +3593,7 @@
             <a:pPr algn="ctr"/>
             <a:r>
               <a:rPr lang="en-US" sz="3800" dirty="0" smtClean="0"/>
-              <a:t>3.2. Clustering</a:t>
+              <a:t>3.3. Heuristic Approaches to Ranking</a:t>
             </a:r>
           </a:p>
           <a:p>
@@ -3564,19 +3609,18 @@
               <a:rPr lang="en-US" sz="3000" dirty="0" smtClean="0"/>
               <a:t> sites’ generic user-specific reputation scores.</a:t>
             </a:r>
-            <a:endParaRPr lang="en-US" sz="3000" dirty="0" smtClean="0"/>
-          </a:p>
-        </p:txBody>
-      </p:sp>
-      <p:sp>
-        <p:nvSpPr>
-          <p:cNvPr id="12" name="Rectangle 11"/>
+          </a:p>
+        </p:txBody>
+      </p:sp>
+      <p:sp>
+        <p:nvSpPr>
+          <p:cNvPr id="13" name="Rectangle 12"/>
           <p:cNvSpPr/>
           <p:nvPr/>
         </p:nvSpPr>
         <p:spPr>
           <a:xfrm>
-            <a:off x="461312" y="17504772"/>
+            <a:off x="10949202" y="19941900"/>
             <a:ext cx="10501419" cy="3447098"/>
           </a:xfrm>
           <a:prstGeom prst="rect">
@@ -3592,13 +3636,8 @@
             <a:pPr algn="ctr"/>
             <a:r>
               <a:rPr lang="en-US" sz="3800" dirty="0" smtClean="0"/>
-              <a:t>3.3. Heuristic Approaches </a:t>
-            </a:r>
-            <a:r>
-              <a:rPr lang="en-US" sz="3800" smtClean="0"/>
-              <a:t>to Ranking</a:t>
-            </a:r>
-            <a:endParaRPr lang="en-US" sz="3800" dirty="0" smtClean="0"/>
+              <a:t>3.4. Supervised Learning</a:t>
+            </a:r>
           </a:p>
           <a:p>
             <a:r>
@@ -3613,55 +3652,81 @@
               <a:rPr lang="en-US" sz="3000" dirty="0" smtClean="0"/>
               <a:t> sites’ generic user-specific reputation scores.</a:t>
             </a:r>
-            <a:endParaRPr lang="en-US" sz="3000" dirty="0" smtClean="0"/>
-          </a:p>
-        </p:txBody>
-      </p:sp>
-      <p:sp>
-        <p:nvSpPr>
-          <p:cNvPr id="13" name="Rectangle 12"/>
-          <p:cNvSpPr/>
+          </a:p>
+        </p:txBody>
+      </p:sp>
+      <p:pic>
+        <p:nvPicPr>
+          <p:cNvPr id="2" name="Picture 1"/>
+          <p:cNvPicPr>
+            <a:picLocks noChangeAspect="1"/>
+          </p:cNvPicPr>
           <p:nvPr/>
-        </p:nvSpPr>
+        </p:nvPicPr>
+        <p:blipFill>
+          <a:blip r:embed="rId2"/>
+          <a:stretch>
+            <a:fillRect/>
+          </a:stretch>
+        </p:blipFill>
         <p:spPr>
           <a:xfrm>
-            <a:off x="10949202" y="17504772"/>
-            <a:ext cx="10501419" cy="3447098"/>
+            <a:off x="10774033" y="15515242"/>
+            <a:ext cx="5049110" cy="3885559"/>
           </a:xfrm>
           <a:prstGeom prst="rect">
             <a:avLst/>
           </a:prstGeom>
         </p:spPr>
-        <p:txBody>
-          <a:bodyPr wrap="square">
-            <a:spAutoFit/>
-          </a:bodyPr>
-          <a:lstStyle/>
-          <a:p>
-            <a:pPr algn="ctr"/>
-            <a:r>
-              <a:rPr lang="en-US" sz="3800" dirty="0" smtClean="0"/>
-              <a:t>3.4. Supervised Learning</a:t>
-            </a:r>
-            <a:endParaRPr lang="en-US" sz="3800" dirty="0" smtClean="0"/>
-          </a:p>
-          <a:p>
-            <a:r>
-              <a:rPr lang="en-US" sz="3000" dirty="0" smtClean="0"/>
-              <a:t>experts are and what it means to be an expert, especially in a particularly granular field, would allow knowledge to be managed and distributed more judiciously throughout the community. Rating the reputation of users through the use of network properties would create a credibility system that supersedes the </a:t>
-            </a:r>
-            <a:r>
-              <a:rPr lang="en-US" sz="3000" dirty="0" err="1" smtClean="0"/>
-              <a:t>StackExchange</a:t>
-            </a:r>
-            <a:r>
-              <a:rPr lang="en-US" sz="3000" dirty="0" smtClean="0"/>
-              <a:t> sites’ generic user-specific reputation scores.</a:t>
-            </a:r>
-            <a:endParaRPr lang="en-US" sz="3000" dirty="0" smtClean="0"/>
-          </a:p>
-        </p:txBody>
-      </p:sp>
+      </p:pic>
+      <p:pic>
+        <p:nvPicPr>
+          <p:cNvPr id="3" name="Picture 2"/>
+          <p:cNvPicPr>
+            <a:picLocks noChangeAspect="1"/>
+          </p:cNvPicPr>
+          <p:nvPr/>
+        </p:nvPicPr>
+        <p:blipFill>
+          <a:blip r:embed="rId3"/>
+          <a:stretch>
+            <a:fillRect/>
+          </a:stretch>
+        </p:blipFill>
+        <p:spPr>
+          <a:xfrm>
+            <a:off x="13033476" y="4428023"/>
+            <a:ext cx="4081386" cy="3569880"/>
+          </a:xfrm>
+          <a:prstGeom prst="rect">
+            <a:avLst/>
+          </a:prstGeom>
+        </p:spPr>
+      </p:pic>
+      <p:pic>
+        <p:nvPicPr>
+          <p:cNvPr id="15" name="Picture 14"/>
+          <p:cNvPicPr>
+            <a:picLocks noChangeAspect="1"/>
+          </p:cNvPicPr>
+          <p:nvPr/>
+        </p:nvPicPr>
+        <p:blipFill>
+          <a:blip r:embed="rId4"/>
+          <a:stretch>
+            <a:fillRect/>
+          </a:stretch>
+        </p:blipFill>
+        <p:spPr>
+          <a:xfrm>
+            <a:off x="16142810" y="15515242"/>
+            <a:ext cx="5307811" cy="3848939"/>
+          </a:xfrm>
+          <a:prstGeom prst="rect">
+            <a:avLst/>
+          </a:prstGeom>
+        </p:spPr>
+      </p:pic>
     </p:spTree>
     <p:extLst>
       <p:ext uri="{BB962C8B-B14F-4D97-AF65-F5344CB8AC3E}">

</xml_diff>

<commit_message>
table added to poster
</commit_message>
<xml_diff>
--- a/Poster.pptx
+++ b/Poster.pptx
@@ -3536,11 +3536,7 @@
             <a:pPr algn="ctr"/>
             <a:r>
               <a:rPr lang="en-US" sz="3800" dirty="0" smtClean="0"/>
-              <a:t>3.2. </a:t>
-            </a:r>
-            <a:r>
-              <a:rPr lang="en-US" sz="3800" dirty="0" smtClean="0"/>
-              <a:t>Clustering</a:t>
+              <a:t>3.2. Clustering</a:t>
             </a:r>
           </a:p>
           <a:p>
@@ -3565,7 +3561,6 @@
               <a:rPr lang="en-US" sz="3000" dirty="0" smtClean="0"/>
               <a:t>means clustering was done using the following features: views, down votes, up votes, out degree, in degree, closeness centrality, eigenvector centrality, and PageRank centrality. Given the silhouette values of 0.973 for 2 clusters, 0.959 for 3 cluster, 0.911 for 4 clusters, and 0.887 for 5 clusters, the peak clustering number is at 2 clusters. </a:t>
             </a:r>
-            <a:endParaRPr lang="en-US" sz="3000" dirty="0" smtClean="0"/>
           </a:p>
         </p:txBody>
       </p:sp>
@@ -3578,7 +3573,7 @@
         <p:spPr>
           <a:xfrm>
             <a:off x="447783" y="20043513"/>
-            <a:ext cx="10501419" cy="3447098"/>
+            <a:ext cx="10501419" cy="1661993"/>
           </a:xfrm>
           <a:prstGeom prst="rect">
             <a:avLst/>
@@ -3598,17 +3593,18 @@
           </a:p>
           <a:p>
             <a:r>
-              <a:rPr lang="en-US" sz="3000" dirty="0" smtClean="0"/>
-              <a:t>experts are and what it means to be an expert, especially in a particularly granular field, would allow knowledge to be managed and distributed more judiciously throughout the community. Rating the reputation of users through the use of network properties would create a credibility system that supersedes the </a:t>
-            </a:r>
-            <a:r>
-              <a:rPr lang="en-US" sz="3000" dirty="0" err="1" smtClean="0"/>
+              <a:rPr lang="en-US" sz="3200" dirty="0"/>
+              <a:t>Heuristic functions successfully prioritize domain expertise over total </a:t>
+            </a:r>
+            <a:r>
+              <a:rPr lang="en-US" sz="3200" dirty="0" err="1"/>
               <a:t>StackExchange</a:t>
             </a:r>
             <a:r>
-              <a:rPr lang="en-US" sz="3000" dirty="0" smtClean="0"/>
-              <a:t> sites’ generic user-specific reputation scores.</a:t>
-            </a:r>
+              <a:rPr lang="en-US" sz="3200" dirty="0"/>
+              <a:t> reputation.</a:t>
+            </a:r>
+            <a:endParaRPr lang="en-US" sz="3000" dirty="0" smtClean="0"/>
           </a:p>
         </p:txBody>
       </p:sp>
@@ -3727,6 +3723,1239 @@
           </a:prstGeom>
         </p:spPr>
       </p:pic>
+      <p:graphicFrame>
+        <p:nvGraphicFramePr>
+          <p:cNvPr id="16" name="Table 15"/>
+          <p:cNvGraphicFramePr>
+            <a:graphicFrameLocks noGrp="1"/>
+          </p:cNvGraphicFramePr>
+          <p:nvPr>
+            <p:extLst>
+              <p:ext uri="{D42A27DB-BD31-4B8C-83A1-F6EECF244321}">
+                <p14:modId xmlns:p14="http://schemas.microsoft.com/office/powerpoint/2010/main" val="4124312004"/>
+              </p:ext>
+            </p:extLst>
+          </p:nvPr>
+        </p:nvGraphicFramePr>
+        <p:xfrm>
+          <a:off x="104548" y="22277417"/>
+          <a:ext cx="10844654" cy="7279432"/>
+        </p:xfrm>
+        <a:graphic>
+          <a:graphicData uri="http://schemas.openxmlformats.org/drawingml/2006/table">
+            <a:tbl>
+              <a:tblPr firstRow="1" bandRow="1">
+                <a:tableStyleId>{5C22544A-7EE6-4342-B048-85BDC9FD1C3A}</a:tableStyleId>
+              </a:tblPr>
+              <a:tblGrid>
+                <a:gridCol w="506285"/>
+                <a:gridCol w="1741551"/>
+                <a:gridCol w="1342445"/>
+                <a:gridCol w="2031809"/>
+                <a:gridCol w="1922963"/>
+                <a:gridCol w="1750365"/>
+                <a:gridCol w="1549236"/>
+              </a:tblGrid>
+              <a:tr h="720840">
+                <a:tc>
+                  <a:txBody>
+                    <a:bodyPr/>
+                    <a:lstStyle/>
+                    <a:p>
+                      <a:endParaRPr lang="en-US" sz="2000" dirty="0"/>
+                    </a:p>
+                  </a:txBody>
+                  <a:tcPr/>
+                </a:tc>
+                <a:tc>
+                  <a:txBody>
+                    <a:bodyPr/>
+                    <a:lstStyle/>
+                    <a:p>
+                      <a:r>
+                        <a:rPr lang="en-US" sz="2000" dirty="0" smtClean="0"/>
+                        <a:t>1. Reputation</a:t>
+                      </a:r>
+                      <a:endParaRPr lang="en-US" sz="2000" dirty="0"/>
+                    </a:p>
+                  </a:txBody>
+                  <a:tcPr/>
+                </a:tc>
+                <a:tc>
+                  <a:txBody>
+                    <a:bodyPr/>
+                    <a:lstStyle/>
+                    <a:p>
+                      <a:r>
+                        <a:rPr lang="en-US" sz="2000" dirty="0" smtClean="0"/>
+                        <a:t>2. Degree</a:t>
+                      </a:r>
+                      <a:endParaRPr lang="en-US" sz="2000" dirty="0"/>
+                    </a:p>
+                  </a:txBody>
+                  <a:tcPr/>
+                </a:tc>
+                <a:tc>
+                  <a:txBody>
+                    <a:bodyPr/>
+                    <a:lstStyle/>
+                    <a:p>
+                      <a:r>
+                        <a:rPr lang="en-US" sz="2000" dirty="0" smtClean="0"/>
+                        <a:t>3. Degree*Votes</a:t>
+                      </a:r>
+                      <a:endParaRPr lang="en-US" sz="2000" dirty="0"/>
+                    </a:p>
+                  </a:txBody>
+                  <a:tcPr/>
+                </a:tc>
+                <a:tc>
+                  <a:txBody>
+                    <a:bodyPr/>
+                    <a:lstStyle/>
+                    <a:p>
+                      <a:r>
+                        <a:rPr lang="en-US" sz="2000" dirty="0" smtClean="0"/>
+                        <a:t>4.Betweenness</a:t>
+                      </a:r>
+                      <a:endParaRPr lang="en-US" sz="2000" dirty="0"/>
+                    </a:p>
+                  </a:txBody>
+                  <a:tcPr/>
+                </a:tc>
+                <a:tc>
+                  <a:txBody>
+                    <a:bodyPr/>
+                    <a:lstStyle/>
+                    <a:p>
+                      <a:r>
+                        <a:rPr lang="en-US" sz="2000" dirty="0" smtClean="0"/>
+                        <a:t>5.EigenVector</a:t>
+                      </a:r>
+                      <a:endParaRPr lang="en-US" sz="2000" dirty="0"/>
+                    </a:p>
+                  </a:txBody>
+                  <a:tcPr/>
+                </a:tc>
+                <a:tc>
+                  <a:txBody>
+                    <a:bodyPr/>
+                    <a:lstStyle/>
+                    <a:p>
+                      <a:r>
+                        <a:rPr lang="en-US" sz="2000" dirty="0" smtClean="0"/>
+                        <a:t>6.PageRank</a:t>
+                      </a:r>
+                      <a:endParaRPr lang="en-US" sz="2000" dirty="0"/>
+                    </a:p>
+                  </a:txBody>
+                  <a:tcPr/>
+                </a:tc>
+              </a:tr>
+              <a:tr h="523553">
+                <a:tc>
+                  <a:txBody>
+                    <a:bodyPr/>
+                    <a:lstStyle/>
+                    <a:p>
+                      <a:r>
+                        <a:rPr lang="en-US" sz="2000" dirty="0" smtClean="0"/>
+                        <a:t>1</a:t>
+                      </a:r>
+                      <a:endParaRPr lang="en-US" sz="2000" dirty="0"/>
+                    </a:p>
+                  </a:txBody>
+                  <a:tcPr/>
+                </a:tc>
+                <a:tc>
+                  <a:txBody>
+                    <a:bodyPr/>
+                    <a:lstStyle/>
+                    <a:p>
+                      <a:r>
+                        <a:rPr lang="en-US" sz="1800" dirty="0" smtClean="0"/>
+                        <a:t>Andre’ Nicolas</a:t>
+                      </a:r>
+                      <a:endParaRPr lang="en-US" sz="1800" dirty="0"/>
+                    </a:p>
+                  </a:txBody>
+                  <a:tcPr/>
+                </a:tc>
+                <a:tc>
+                  <a:txBody>
+                    <a:bodyPr/>
+                    <a:lstStyle/>
+                    <a:p>
+                      <a:r>
+                        <a:rPr lang="en-US" sz="1800" dirty="0" err="1" smtClean="0"/>
+                        <a:t>MvG</a:t>
+                      </a:r>
+                      <a:endParaRPr lang="en-US" sz="1800" dirty="0"/>
+                    </a:p>
+                  </a:txBody>
+                  <a:tcPr/>
+                </a:tc>
+                <a:tc>
+                  <a:txBody>
+                    <a:bodyPr/>
+                    <a:lstStyle/>
+                    <a:p>
+                      <a:r>
+                        <a:rPr lang="en-US" sz="1800" dirty="0" smtClean="0"/>
+                        <a:t>Ross Millikan</a:t>
+                      </a:r>
+                      <a:endParaRPr lang="en-US" sz="1800" dirty="0"/>
+                    </a:p>
+                  </a:txBody>
+                  <a:tcPr/>
+                </a:tc>
+                <a:tc>
+                  <a:txBody>
+                    <a:bodyPr/>
+                    <a:lstStyle/>
+                    <a:p>
+                      <a:r>
+                        <a:rPr lang="en-US" sz="1800" dirty="0" err="1" smtClean="0"/>
+                        <a:t>MvG</a:t>
+                      </a:r>
+                      <a:endParaRPr lang="en-US" sz="1800" dirty="0"/>
+                    </a:p>
+                  </a:txBody>
+                  <a:tcPr/>
+                </a:tc>
+                <a:tc>
+                  <a:txBody>
+                    <a:bodyPr/>
+                    <a:lstStyle/>
+                    <a:p>
+                      <a:r>
+                        <a:rPr lang="en-US" sz="1800" dirty="0" err="1" smtClean="0"/>
+                        <a:t>MvG</a:t>
+                      </a:r>
+                      <a:endParaRPr lang="en-US" sz="1800" dirty="0"/>
+                    </a:p>
+                  </a:txBody>
+                  <a:tcPr/>
+                </a:tc>
+                <a:tc>
+                  <a:txBody>
+                    <a:bodyPr/>
+                    <a:lstStyle/>
+                    <a:p>
+                      <a:r>
+                        <a:rPr lang="en-US" sz="1800" dirty="0" smtClean="0"/>
+                        <a:t>Henning </a:t>
+                      </a:r>
+                      <a:r>
+                        <a:rPr lang="en-US" sz="1800" dirty="0" err="1" smtClean="0"/>
+                        <a:t>Makholm</a:t>
+                      </a:r>
+                      <a:endParaRPr lang="en-US" sz="1800" dirty="0"/>
+                    </a:p>
+                  </a:txBody>
+                  <a:tcPr/>
+                </a:tc>
+              </a:tr>
+              <a:tr h="523553">
+                <a:tc>
+                  <a:txBody>
+                    <a:bodyPr/>
+                    <a:lstStyle/>
+                    <a:p>
+                      <a:r>
+                        <a:rPr lang="en-US" sz="2000" dirty="0" smtClean="0"/>
+                        <a:t>2</a:t>
+                      </a:r>
+                      <a:endParaRPr lang="en-US" sz="2000" dirty="0"/>
+                    </a:p>
+                  </a:txBody>
+                  <a:tcPr/>
+                </a:tc>
+                <a:tc>
+                  <a:txBody>
+                    <a:bodyPr/>
+                    <a:lstStyle/>
+                    <a:p>
+                      <a:r>
+                        <a:rPr lang="en-US" sz="1800" dirty="0" smtClean="0"/>
+                        <a:t>Brian M. Scott</a:t>
+                      </a:r>
+                      <a:endParaRPr lang="en-US" sz="1800" dirty="0"/>
+                    </a:p>
+                  </a:txBody>
+                  <a:tcPr/>
+                </a:tc>
+                <a:tc>
+                  <a:txBody>
+                    <a:bodyPr/>
+                    <a:lstStyle/>
+                    <a:p>
+                      <a:r>
+                        <a:rPr lang="en-US" sz="1800" dirty="0" smtClean="0"/>
+                        <a:t>Ross Millikan</a:t>
+                      </a:r>
+                      <a:endParaRPr lang="en-US" sz="1800" dirty="0"/>
+                    </a:p>
+                  </a:txBody>
+                  <a:tcPr/>
+                </a:tc>
+                <a:tc>
+                  <a:txBody>
+                    <a:bodyPr/>
+                    <a:lstStyle/>
+                    <a:p>
+                      <a:r>
+                        <a:rPr lang="en-US" sz="1800" dirty="0" smtClean="0"/>
+                        <a:t>Andre/ Nicolas</a:t>
+                      </a:r>
+                      <a:endParaRPr lang="en-US" sz="1800" dirty="0"/>
+                    </a:p>
+                  </a:txBody>
+                  <a:tcPr/>
+                </a:tc>
+                <a:tc>
+                  <a:txBody>
+                    <a:bodyPr/>
+                    <a:lstStyle/>
+                    <a:p>
+                      <a:r>
+                        <a:rPr lang="en-US" sz="1800" dirty="0" smtClean="0"/>
+                        <a:t>Ross Millikan</a:t>
+                      </a:r>
+                      <a:endParaRPr lang="en-US" sz="1800" dirty="0"/>
+                    </a:p>
+                  </a:txBody>
+                  <a:tcPr/>
+                </a:tc>
+                <a:tc>
+                  <a:txBody>
+                    <a:bodyPr/>
+                    <a:lstStyle/>
+                    <a:p>
+                      <a:r>
+                        <a:rPr lang="en-US" sz="1800" dirty="0" smtClean="0"/>
+                        <a:t>Ross Millikan</a:t>
+                      </a:r>
+                      <a:endParaRPr lang="en-US" sz="1800" dirty="0"/>
+                    </a:p>
+                  </a:txBody>
+                  <a:tcPr/>
+                </a:tc>
+                <a:tc>
+                  <a:txBody>
+                    <a:bodyPr/>
+                    <a:lstStyle/>
+                    <a:p>
+                      <a:r>
+                        <a:rPr lang="en-US" sz="1800" dirty="0" smtClean="0"/>
+                        <a:t>Andre’ Nicolas</a:t>
+                      </a:r>
+                      <a:endParaRPr lang="en-US" sz="1800" dirty="0"/>
+                    </a:p>
+                  </a:txBody>
+                  <a:tcPr/>
+                </a:tc>
+              </a:tr>
+              <a:tr h="523553">
+                <a:tc>
+                  <a:txBody>
+                    <a:bodyPr/>
+                    <a:lstStyle/>
+                    <a:p>
+                      <a:r>
+                        <a:rPr lang="en-US" sz="2000" dirty="0" smtClean="0"/>
+                        <a:t>3</a:t>
+                      </a:r>
+                      <a:endParaRPr lang="en-US" sz="2000" dirty="0"/>
+                    </a:p>
+                  </a:txBody>
+                  <a:tcPr/>
+                </a:tc>
+                <a:tc>
+                  <a:txBody>
+                    <a:bodyPr/>
+                    <a:lstStyle/>
+                    <a:p>
+                      <a:r>
+                        <a:rPr lang="en-US" sz="1800" dirty="0" err="1" smtClean="0"/>
+                        <a:t>Asaf</a:t>
+                      </a:r>
+                      <a:r>
+                        <a:rPr lang="en-US" sz="1800" dirty="0" smtClean="0"/>
+                        <a:t> </a:t>
+                      </a:r>
+                      <a:r>
+                        <a:rPr lang="en-US" sz="1800" dirty="0" err="1" smtClean="0"/>
+                        <a:t>Karagila</a:t>
+                      </a:r>
+                      <a:endParaRPr lang="en-US" sz="1800" dirty="0"/>
+                    </a:p>
+                  </a:txBody>
+                  <a:tcPr/>
+                </a:tc>
+                <a:tc>
+                  <a:txBody>
+                    <a:bodyPr/>
+                    <a:lstStyle/>
+                    <a:p>
+                      <a:r>
+                        <a:rPr lang="en-US" sz="1800" dirty="0" smtClean="0"/>
+                        <a:t>Andre’ Nicolas</a:t>
+                      </a:r>
+                      <a:endParaRPr lang="en-US" sz="1800" dirty="0"/>
+                    </a:p>
+                  </a:txBody>
+                  <a:tcPr/>
+                </a:tc>
+                <a:tc>
+                  <a:txBody>
+                    <a:bodyPr/>
+                    <a:lstStyle/>
+                    <a:p>
+                      <a:r>
+                        <a:rPr lang="en-US" sz="1800" dirty="0" err="1" smtClean="0"/>
+                        <a:t>amWhy</a:t>
+                      </a:r>
+                      <a:endParaRPr lang="en-US" sz="1800" dirty="0"/>
+                    </a:p>
+                  </a:txBody>
+                  <a:tcPr/>
+                </a:tc>
+                <a:tc>
+                  <a:txBody>
+                    <a:bodyPr/>
+                    <a:lstStyle/>
+                    <a:p>
+                      <a:r>
+                        <a:rPr lang="en-US" sz="1800" dirty="0" smtClean="0"/>
+                        <a:t>Blue</a:t>
+                      </a:r>
+                      <a:endParaRPr lang="en-US" sz="1800" dirty="0"/>
+                    </a:p>
+                  </a:txBody>
+                  <a:tcPr/>
+                </a:tc>
+                <a:tc>
+                  <a:txBody>
+                    <a:bodyPr/>
+                    <a:lstStyle/>
+                    <a:p>
+                      <a:r>
+                        <a:rPr lang="en-US" sz="1800" dirty="0" smtClean="0"/>
+                        <a:t>Blue</a:t>
+                      </a:r>
+                      <a:endParaRPr lang="en-US" sz="1800" dirty="0"/>
+                    </a:p>
+                  </a:txBody>
+                  <a:tcPr/>
+                </a:tc>
+                <a:tc>
+                  <a:txBody>
+                    <a:bodyPr/>
+                    <a:lstStyle/>
+                    <a:p>
+                      <a:r>
+                        <a:rPr lang="en-US" sz="1800" dirty="0" smtClean="0"/>
+                        <a:t>Ross Millikan</a:t>
+                      </a:r>
+                      <a:endParaRPr lang="en-US" sz="1800" dirty="0"/>
+                    </a:p>
+                  </a:txBody>
+                  <a:tcPr/>
+                </a:tc>
+              </a:tr>
+              <a:tr h="523553">
+                <a:tc>
+                  <a:txBody>
+                    <a:bodyPr/>
+                    <a:lstStyle/>
+                    <a:p>
+                      <a:r>
+                        <a:rPr lang="en-US" sz="2000" dirty="0" smtClean="0"/>
+                        <a:t>4</a:t>
+                      </a:r>
+                      <a:endParaRPr lang="en-US" sz="2000" dirty="0"/>
+                    </a:p>
+                  </a:txBody>
+                  <a:tcPr/>
+                </a:tc>
+                <a:tc>
+                  <a:txBody>
+                    <a:bodyPr/>
+                    <a:lstStyle/>
+                    <a:p>
+                      <a:r>
+                        <a:rPr lang="en-US" sz="1800" dirty="0" smtClean="0"/>
+                        <a:t>Did</a:t>
+                      </a:r>
+                      <a:endParaRPr lang="en-US" sz="1800" dirty="0"/>
+                    </a:p>
+                  </a:txBody>
+                  <a:tcPr/>
+                </a:tc>
+                <a:tc>
+                  <a:txBody>
+                    <a:bodyPr/>
+                    <a:lstStyle/>
+                    <a:p>
+                      <a:r>
+                        <a:rPr lang="en-US" sz="1800" dirty="0" smtClean="0"/>
+                        <a:t>Blue</a:t>
+                      </a:r>
+                      <a:endParaRPr lang="en-US" sz="1800" dirty="0"/>
+                    </a:p>
+                  </a:txBody>
+                  <a:tcPr/>
+                </a:tc>
+                <a:tc>
+                  <a:txBody>
+                    <a:bodyPr/>
+                    <a:lstStyle/>
+                    <a:p>
+                      <a:r>
+                        <a:rPr lang="en-US" sz="1800" dirty="0" smtClean="0"/>
+                        <a:t>Michael Hardy</a:t>
+                      </a:r>
+                      <a:endParaRPr lang="en-US" sz="1800" dirty="0"/>
+                    </a:p>
+                  </a:txBody>
+                  <a:tcPr/>
+                </a:tc>
+                <a:tc>
+                  <a:txBody>
+                    <a:bodyPr/>
+                    <a:lstStyle/>
+                    <a:p>
+                      <a:r>
+                        <a:rPr lang="en-US" sz="1800" dirty="0" smtClean="0"/>
+                        <a:t>Andre’ Nicolas</a:t>
+                      </a:r>
+                      <a:endParaRPr lang="en-US" sz="1800" dirty="0"/>
+                    </a:p>
+                  </a:txBody>
+                  <a:tcPr/>
+                </a:tc>
+                <a:tc>
+                  <a:txBody>
+                    <a:bodyPr/>
+                    <a:lstStyle/>
+                    <a:p>
+                      <a:r>
+                        <a:rPr lang="en-US" sz="1800" dirty="0" smtClean="0"/>
+                        <a:t>Christian </a:t>
+                      </a:r>
+                      <a:r>
+                        <a:rPr lang="en-US" sz="1800" dirty="0" err="1" smtClean="0"/>
+                        <a:t>Blatter</a:t>
+                      </a:r>
+                      <a:endParaRPr lang="en-US" sz="1800" dirty="0"/>
+                    </a:p>
+                  </a:txBody>
+                  <a:tcPr/>
+                </a:tc>
+                <a:tc>
+                  <a:txBody>
+                    <a:bodyPr/>
+                    <a:lstStyle/>
+                    <a:p>
+                      <a:r>
+                        <a:rPr lang="en-US" sz="1800" dirty="0" smtClean="0"/>
+                        <a:t>Hagen von </a:t>
+                      </a:r>
+                      <a:r>
+                        <a:rPr lang="en-US" sz="1800" dirty="0" err="1" smtClean="0"/>
+                        <a:t>Eitzen</a:t>
+                      </a:r>
+                      <a:endParaRPr lang="en-US" sz="1800" dirty="0"/>
+                    </a:p>
+                  </a:txBody>
+                  <a:tcPr/>
+                </a:tc>
+              </a:tr>
+              <a:tr h="0">
+                <a:tc>
+                  <a:txBody>
+                    <a:bodyPr/>
+                    <a:lstStyle/>
+                    <a:p>
+                      <a:r>
+                        <a:rPr lang="en-US" sz="2000" dirty="0" smtClean="0"/>
+                        <a:t>5</a:t>
+                      </a:r>
+                      <a:endParaRPr lang="en-US" sz="2000" dirty="0"/>
+                    </a:p>
+                  </a:txBody>
+                  <a:tcPr/>
+                </a:tc>
+                <a:tc>
+                  <a:txBody>
+                    <a:bodyPr/>
+                    <a:lstStyle/>
+                    <a:p>
+                      <a:r>
+                        <a:rPr lang="en-US" sz="1800" dirty="0" smtClean="0"/>
+                        <a:t>Arturo </a:t>
+                      </a:r>
+                      <a:r>
+                        <a:rPr lang="en-US" sz="1800" dirty="0" err="1" smtClean="0"/>
+                        <a:t>Magidin</a:t>
+                      </a:r>
+                      <a:endParaRPr lang="en-US" sz="1800" dirty="0"/>
+                    </a:p>
+                  </a:txBody>
+                  <a:tcPr/>
+                </a:tc>
+                <a:tc>
+                  <a:txBody>
+                    <a:bodyPr/>
+                    <a:lstStyle/>
+                    <a:p>
+                      <a:r>
+                        <a:rPr lang="en-US" sz="1800" dirty="0" smtClean="0"/>
+                        <a:t>Christian</a:t>
+                      </a:r>
+                      <a:r>
+                        <a:rPr lang="en-US" sz="1800" baseline="0" dirty="0" smtClean="0"/>
+                        <a:t> </a:t>
+                      </a:r>
+                      <a:r>
+                        <a:rPr lang="en-US" sz="1800" dirty="0" smtClean="0"/>
+                        <a:t> </a:t>
+                      </a:r>
+                      <a:r>
+                        <a:rPr lang="en-US" sz="1800" dirty="0" err="1" smtClean="0"/>
+                        <a:t>Blatter</a:t>
+                      </a:r>
+                      <a:endParaRPr lang="en-US" sz="1800" dirty="0"/>
+                    </a:p>
+                  </a:txBody>
+                  <a:tcPr/>
+                </a:tc>
+                <a:tc>
+                  <a:txBody>
+                    <a:bodyPr/>
+                    <a:lstStyle/>
+                    <a:p>
+                      <a:r>
+                        <a:rPr lang="en-US" sz="1800" dirty="0" err="1" smtClean="0"/>
+                        <a:t>Ihf</a:t>
+                      </a:r>
+                      <a:endParaRPr lang="en-US" sz="1800" dirty="0"/>
+                    </a:p>
+                  </a:txBody>
+                  <a:tcPr/>
+                </a:tc>
+                <a:tc>
+                  <a:txBody>
+                    <a:bodyPr/>
+                    <a:lstStyle/>
+                    <a:p>
+                      <a:r>
+                        <a:rPr lang="en-US" sz="1800" dirty="0" smtClean="0"/>
+                        <a:t>Christian </a:t>
+                      </a:r>
+                      <a:r>
+                        <a:rPr lang="en-US" sz="1800" dirty="0" err="1" smtClean="0"/>
+                        <a:t>Blatter</a:t>
+                      </a:r>
+                      <a:endParaRPr lang="en-US" sz="1800" dirty="0"/>
+                    </a:p>
+                  </a:txBody>
+                  <a:tcPr/>
+                </a:tc>
+                <a:tc>
+                  <a:txBody>
+                    <a:bodyPr/>
+                    <a:lstStyle/>
+                    <a:p>
+                      <a:r>
+                        <a:rPr lang="en-US" sz="1800" dirty="0" smtClean="0"/>
+                        <a:t>Andre’ Nicolas</a:t>
+                      </a:r>
+                      <a:endParaRPr lang="en-US" sz="1800" dirty="0"/>
+                    </a:p>
+                  </a:txBody>
+                  <a:tcPr/>
+                </a:tc>
+                <a:tc>
+                  <a:txBody>
+                    <a:bodyPr/>
+                    <a:lstStyle/>
+                    <a:p>
+                      <a:r>
+                        <a:rPr lang="en-US" sz="1800" dirty="0" err="1" smtClean="0"/>
+                        <a:t>robkohn</a:t>
+                      </a:r>
+                      <a:endParaRPr lang="en-US" sz="1800" dirty="0"/>
+                    </a:p>
+                  </a:txBody>
+                  <a:tcPr/>
+                </a:tc>
+              </a:tr>
+              <a:tr h="523553">
+                <a:tc>
+                  <a:txBody>
+                    <a:bodyPr/>
+                    <a:lstStyle/>
+                    <a:p>
+                      <a:r>
+                        <a:rPr lang="en-US" sz="2000" dirty="0" smtClean="0"/>
+                        <a:t>6</a:t>
+                      </a:r>
+                      <a:endParaRPr lang="en-US" sz="2000" dirty="0"/>
+                    </a:p>
+                  </a:txBody>
+                  <a:tcPr/>
+                </a:tc>
+                <a:tc>
+                  <a:txBody>
+                    <a:bodyPr/>
+                    <a:lstStyle/>
+                    <a:p>
+                      <a:r>
+                        <a:rPr lang="en-US" sz="1800" dirty="0" err="1" smtClean="0"/>
+                        <a:t>Qiaochu</a:t>
+                      </a:r>
+                      <a:r>
+                        <a:rPr lang="en-US" sz="1800" dirty="0" smtClean="0"/>
+                        <a:t> Yuan</a:t>
+                      </a:r>
+                      <a:endParaRPr lang="en-US" sz="1800" dirty="0"/>
+                    </a:p>
+                  </a:txBody>
+                  <a:tcPr/>
+                </a:tc>
+                <a:tc>
+                  <a:txBody>
+                    <a:bodyPr/>
+                    <a:lstStyle/>
+                    <a:p>
+                      <a:r>
+                        <a:rPr lang="en-US" sz="1800" dirty="0" smtClean="0"/>
+                        <a:t>Hagen von </a:t>
+                      </a:r>
+                      <a:r>
+                        <a:rPr lang="en-US" sz="1800" dirty="0" err="1" smtClean="0"/>
+                        <a:t>Eitzen</a:t>
+                      </a:r>
+                      <a:endParaRPr lang="en-US" sz="1800" dirty="0"/>
+                    </a:p>
+                  </a:txBody>
+                  <a:tcPr/>
+                </a:tc>
+                <a:tc>
+                  <a:txBody>
+                    <a:bodyPr/>
+                    <a:lstStyle/>
+                    <a:p>
+                      <a:r>
+                        <a:rPr lang="en-US" sz="1800" dirty="0" err="1" smtClean="0"/>
+                        <a:t>Robjohn</a:t>
+                      </a:r>
+                      <a:endParaRPr lang="en-US" sz="1800" dirty="0"/>
+                    </a:p>
+                  </a:txBody>
+                  <a:tcPr/>
+                </a:tc>
+                <a:tc>
+                  <a:txBody>
+                    <a:bodyPr/>
+                    <a:lstStyle/>
+                    <a:p>
+                      <a:r>
+                        <a:rPr lang="en-US" sz="1800" dirty="0" smtClean="0"/>
+                        <a:t>Mick</a:t>
+                      </a:r>
+                      <a:endParaRPr lang="en-US" sz="1800" dirty="0"/>
+                    </a:p>
+                  </a:txBody>
+                  <a:tcPr/>
+                </a:tc>
+                <a:tc>
+                  <a:txBody>
+                    <a:bodyPr/>
+                    <a:lstStyle/>
+                    <a:p>
+                      <a:r>
+                        <a:rPr lang="en-US" sz="1800" dirty="0" smtClean="0"/>
+                        <a:t>Mick</a:t>
+                      </a:r>
+                      <a:endParaRPr lang="en-US" sz="1800" dirty="0"/>
+                    </a:p>
+                  </a:txBody>
+                  <a:tcPr/>
+                </a:tc>
+                <a:tc>
+                  <a:txBody>
+                    <a:bodyPr/>
+                    <a:lstStyle/>
+                    <a:p>
+                      <a:r>
+                        <a:rPr lang="en-US" sz="1800" dirty="0" err="1" smtClean="0"/>
+                        <a:t>joriki</a:t>
+                      </a:r>
+                      <a:endParaRPr lang="en-US" sz="1800" dirty="0"/>
+                    </a:p>
+                  </a:txBody>
+                  <a:tcPr/>
+                </a:tc>
+              </a:tr>
+              <a:tr h="523553">
+                <a:tc>
+                  <a:txBody>
+                    <a:bodyPr/>
+                    <a:lstStyle/>
+                    <a:p>
+                      <a:r>
+                        <a:rPr lang="en-US" sz="2000" dirty="0" smtClean="0"/>
+                        <a:t>7</a:t>
+                      </a:r>
+                      <a:endParaRPr lang="en-US" sz="2000" dirty="0"/>
+                    </a:p>
+                  </a:txBody>
+                  <a:tcPr/>
+                </a:tc>
+                <a:tc>
+                  <a:txBody>
+                    <a:bodyPr/>
+                    <a:lstStyle/>
+                    <a:p>
+                      <a:r>
+                        <a:rPr lang="en-US" sz="1800" dirty="0" smtClean="0"/>
+                        <a:t>Robert </a:t>
+                      </a:r>
+                      <a:r>
+                        <a:rPr lang="en-US" sz="1800" dirty="0" err="1" smtClean="0"/>
+                        <a:t>Isreal</a:t>
+                      </a:r>
+                      <a:endParaRPr lang="en-US" sz="1800" dirty="0"/>
+                    </a:p>
+                  </a:txBody>
+                  <a:tcPr/>
+                </a:tc>
+                <a:tc>
+                  <a:txBody>
+                    <a:bodyPr/>
+                    <a:lstStyle/>
+                    <a:p>
+                      <a:r>
+                        <a:rPr lang="en-US" sz="1800" dirty="0" smtClean="0"/>
+                        <a:t>Jack </a:t>
+                      </a:r>
+                      <a:r>
+                        <a:rPr lang="en-US" sz="1800" dirty="0" err="1" smtClean="0"/>
+                        <a:t>D’Aurizio</a:t>
+                      </a:r>
+                      <a:endParaRPr lang="en-US" sz="1800" dirty="0"/>
+                    </a:p>
+                  </a:txBody>
+                  <a:tcPr/>
+                </a:tc>
+                <a:tc>
+                  <a:txBody>
+                    <a:bodyPr/>
+                    <a:lstStyle/>
+                    <a:p>
+                      <a:r>
+                        <a:rPr lang="en-US" sz="1800" dirty="0" smtClean="0"/>
+                        <a:t>Hagen von </a:t>
+                      </a:r>
+                      <a:r>
+                        <a:rPr lang="en-US" sz="1800" dirty="0" err="1" smtClean="0"/>
+                        <a:t>Eitzen</a:t>
+                      </a:r>
+                      <a:endParaRPr lang="en-US" sz="1800" dirty="0"/>
+                    </a:p>
+                  </a:txBody>
+                  <a:tcPr/>
+                </a:tc>
+                <a:tc>
+                  <a:txBody>
+                    <a:bodyPr/>
+                    <a:lstStyle/>
+                    <a:p>
+                      <a:r>
+                        <a:rPr lang="en-US" sz="1800" dirty="0" smtClean="0"/>
+                        <a:t>Hagen von </a:t>
+                      </a:r>
+                      <a:r>
+                        <a:rPr lang="en-US" sz="1800" dirty="0" err="1" smtClean="0"/>
+                        <a:t>Eitzen</a:t>
+                      </a:r>
+                      <a:endParaRPr lang="en-US" sz="1800" dirty="0"/>
+                    </a:p>
+                  </a:txBody>
+                  <a:tcPr/>
+                </a:tc>
+                <a:tc>
+                  <a:txBody>
+                    <a:bodyPr/>
+                    <a:lstStyle/>
+                    <a:p>
+                      <a:r>
+                        <a:rPr lang="en-US" sz="1800" dirty="0" smtClean="0"/>
+                        <a:t>Jack </a:t>
+                      </a:r>
+                      <a:r>
+                        <a:rPr lang="en-US" sz="1800" dirty="0" err="1" smtClean="0"/>
+                        <a:t>D’Aurizio</a:t>
+                      </a:r>
+                      <a:endParaRPr lang="en-US" sz="1800" dirty="0"/>
+                    </a:p>
+                  </a:txBody>
+                  <a:tcPr/>
+                </a:tc>
+                <a:tc>
+                  <a:txBody>
+                    <a:bodyPr/>
+                    <a:lstStyle/>
+                    <a:p>
+                      <a:r>
+                        <a:rPr lang="en-US" sz="1800" dirty="0" smtClean="0"/>
+                        <a:t>Blue</a:t>
+                      </a:r>
+                      <a:endParaRPr lang="en-US" sz="1800" dirty="0"/>
+                    </a:p>
+                  </a:txBody>
+                  <a:tcPr/>
+                </a:tc>
+              </a:tr>
+              <a:tr h="523553">
+                <a:tc>
+                  <a:txBody>
+                    <a:bodyPr/>
+                    <a:lstStyle/>
+                    <a:p>
+                      <a:r>
+                        <a:rPr lang="en-US" sz="2000" dirty="0" smtClean="0"/>
+                        <a:t>8</a:t>
+                      </a:r>
+                      <a:endParaRPr lang="en-US" sz="2000" dirty="0"/>
+                    </a:p>
+                  </a:txBody>
+                  <a:tcPr/>
+                </a:tc>
+                <a:tc>
+                  <a:txBody>
+                    <a:bodyPr/>
+                    <a:lstStyle/>
+                    <a:p>
+                      <a:r>
+                        <a:rPr lang="en-US" sz="1800" dirty="0" err="1" smtClean="0"/>
+                        <a:t>Robjohn</a:t>
+                      </a:r>
+                      <a:endParaRPr lang="en-US" sz="1800" dirty="0"/>
+                    </a:p>
+                  </a:txBody>
+                  <a:tcPr/>
+                </a:tc>
+                <a:tc>
+                  <a:txBody>
+                    <a:bodyPr/>
+                    <a:lstStyle/>
+                    <a:p>
+                      <a:r>
+                        <a:rPr lang="en-US" sz="1800" dirty="0" err="1" smtClean="0"/>
+                        <a:t>Joriki</a:t>
+                      </a:r>
+                      <a:endParaRPr lang="en-US" sz="1800" dirty="0"/>
+                    </a:p>
+                  </a:txBody>
+                  <a:tcPr/>
+                </a:tc>
+                <a:tc>
+                  <a:txBody>
+                    <a:bodyPr/>
+                    <a:lstStyle/>
+                    <a:p>
+                      <a:r>
+                        <a:rPr lang="en-US" sz="1800" dirty="0" smtClean="0"/>
+                        <a:t>Gerry Myerson</a:t>
+                      </a:r>
+                      <a:endParaRPr lang="en-US" sz="1800" dirty="0"/>
+                    </a:p>
+                  </a:txBody>
+                  <a:tcPr/>
+                </a:tc>
+                <a:tc>
+                  <a:txBody>
+                    <a:bodyPr/>
+                    <a:lstStyle/>
+                    <a:p>
+                      <a:r>
+                        <a:rPr lang="en-US" sz="1800" dirty="0" smtClean="0"/>
+                        <a:t>Joseph O’Rourke</a:t>
+                      </a:r>
+                      <a:endParaRPr lang="en-US" sz="1800" dirty="0"/>
+                    </a:p>
+                  </a:txBody>
+                  <a:tcPr/>
+                </a:tc>
+                <a:tc>
+                  <a:txBody>
+                    <a:bodyPr/>
+                    <a:lstStyle/>
+                    <a:p>
+                      <a:r>
+                        <a:rPr lang="en-US" sz="1800" dirty="0" smtClean="0"/>
+                        <a:t>Hagen von </a:t>
+                      </a:r>
+                      <a:r>
+                        <a:rPr lang="en-US" sz="1800" dirty="0" err="1" smtClean="0"/>
+                        <a:t>Eitzen</a:t>
+                      </a:r>
+                      <a:endParaRPr lang="en-US" sz="1800" dirty="0"/>
+                    </a:p>
+                  </a:txBody>
+                  <a:tcPr/>
+                </a:tc>
+                <a:tc>
+                  <a:txBody>
+                    <a:bodyPr/>
+                    <a:lstStyle/>
+                    <a:p>
+                      <a:r>
+                        <a:rPr lang="en-US" sz="1800" dirty="0" smtClean="0"/>
+                        <a:t>Jack </a:t>
+                      </a:r>
+                      <a:r>
+                        <a:rPr lang="en-US" sz="1800" dirty="0" err="1" smtClean="0"/>
+                        <a:t>D’Aurisio</a:t>
+                      </a:r>
+                      <a:endParaRPr lang="en-US" sz="1800" dirty="0"/>
+                    </a:p>
+                  </a:txBody>
+                  <a:tcPr/>
+                </a:tc>
+              </a:tr>
+              <a:tr h="523553">
+                <a:tc>
+                  <a:txBody>
+                    <a:bodyPr/>
+                    <a:lstStyle/>
+                    <a:p>
+                      <a:r>
+                        <a:rPr lang="en-US" sz="2000" dirty="0" smtClean="0"/>
+                        <a:t>9</a:t>
+                      </a:r>
+                      <a:endParaRPr lang="en-US" sz="2000" dirty="0"/>
+                    </a:p>
+                  </a:txBody>
+                  <a:tcPr/>
+                </a:tc>
+                <a:tc>
+                  <a:txBody>
+                    <a:bodyPr/>
+                    <a:lstStyle/>
+                    <a:p>
+                      <a:r>
+                        <a:rPr lang="en-US" sz="1800" dirty="0" smtClean="0"/>
+                        <a:t>Ross Millikan</a:t>
+                      </a:r>
+                      <a:endParaRPr lang="en-US" sz="1800" dirty="0"/>
+                    </a:p>
+                  </a:txBody>
+                  <a:tcPr/>
+                </a:tc>
+                <a:tc>
+                  <a:txBody>
+                    <a:bodyPr/>
+                    <a:lstStyle/>
+                    <a:p>
+                      <a:r>
+                        <a:rPr lang="en-US" sz="1800" dirty="0" smtClean="0"/>
+                        <a:t>Mick</a:t>
+                      </a:r>
+                      <a:endParaRPr lang="en-US" sz="1800" dirty="0"/>
+                    </a:p>
+                  </a:txBody>
+                  <a:tcPr/>
+                </a:tc>
+                <a:tc>
+                  <a:txBody>
+                    <a:bodyPr/>
+                    <a:lstStyle/>
+                    <a:p>
+                      <a:r>
+                        <a:rPr lang="en-US" sz="1800" dirty="0" smtClean="0"/>
+                        <a:t>Guess who it is.</a:t>
+                      </a:r>
+                      <a:endParaRPr lang="en-US" sz="1800" dirty="0"/>
+                    </a:p>
+                  </a:txBody>
+                  <a:tcPr/>
+                </a:tc>
+                <a:tc>
+                  <a:txBody>
+                    <a:bodyPr/>
+                    <a:lstStyle/>
+                    <a:p>
+                      <a:r>
+                        <a:rPr lang="en-US" sz="1800" dirty="0" smtClean="0"/>
+                        <a:t>Bubba</a:t>
+                      </a:r>
+                      <a:endParaRPr lang="en-US" sz="1800" dirty="0"/>
+                    </a:p>
+                  </a:txBody>
+                  <a:tcPr/>
+                </a:tc>
+                <a:tc>
+                  <a:txBody>
+                    <a:bodyPr/>
+                    <a:lstStyle/>
+                    <a:p>
+                      <a:r>
+                        <a:rPr lang="en-US" sz="1800" dirty="0" smtClean="0"/>
+                        <a:t>Bubba</a:t>
+                      </a:r>
+                      <a:endParaRPr lang="en-US" sz="1800" dirty="0"/>
+                    </a:p>
+                  </a:txBody>
+                  <a:tcPr/>
+                </a:tc>
+                <a:tc>
+                  <a:txBody>
+                    <a:bodyPr/>
+                    <a:lstStyle/>
+                    <a:p>
+                      <a:r>
+                        <a:rPr lang="en-US" sz="1800" dirty="0" err="1" smtClean="0"/>
+                        <a:t>MvG</a:t>
+                      </a:r>
+                      <a:endParaRPr lang="en-US" sz="1800" dirty="0"/>
+                    </a:p>
+                  </a:txBody>
+                  <a:tcPr/>
+                </a:tc>
+              </a:tr>
+              <a:tr h="583823">
+                <a:tc>
+                  <a:txBody>
+                    <a:bodyPr/>
+                    <a:lstStyle/>
+                    <a:p>
+                      <a:r>
+                        <a:rPr lang="en-US" sz="2000" dirty="0" smtClean="0"/>
+                        <a:t>10</a:t>
+                      </a:r>
+                      <a:endParaRPr lang="en-US" sz="2000" dirty="0"/>
+                    </a:p>
+                  </a:txBody>
+                  <a:tcPr/>
+                </a:tc>
+                <a:tc>
+                  <a:txBody>
+                    <a:bodyPr/>
+                    <a:lstStyle/>
+                    <a:p>
+                      <a:r>
+                        <a:rPr lang="en-US" sz="1800" dirty="0" smtClean="0"/>
+                        <a:t>Bill Dubuque</a:t>
+                      </a:r>
+                      <a:endParaRPr lang="en-US" sz="1800" dirty="0"/>
+                    </a:p>
+                  </a:txBody>
+                  <a:tcPr/>
+                </a:tc>
+                <a:tc>
+                  <a:txBody>
+                    <a:bodyPr/>
+                    <a:lstStyle/>
+                    <a:p>
+                      <a:r>
+                        <a:rPr lang="en-US" sz="1800" dirty="0" smtClean="0"/>
+                        <a:t>Lab</a:t>
+                      </a:r>
+                      <a:r>
+                        <a:rPr lang="en-US" sz="1800" baseline="0" dirty="0" smtClean="0"/>
+                        <a:t> </a:t>
+                      </a:r>
+                      <a:r>
+                        <a:rPr lang="en-US" sz="1800" baseline="0" dirty="0" err="1" smtClean="0"/>
+                        <a:t>bhattacharjee</a:t>
+                      </a:r>
+                      <a:endParaRPr lang="en-US" sz="1800" dirty="0"/>
+                    </a:p>
+                  </a:txBody>
+                  <a:tcPr/>
+                </a:tc>
+                <a:tc>
+                  <a:txBody>
+                    <a:bodyPr/>
+                    <a:lstStyle/>
+                    <a:p>
+                      <a:r>
+                        <a:rPr lang="en-US" sz="1800" dirty="0" smtClean="0"/>
+                        <a:t>Christia</a:t>
+                      </a:r>
+                      <a:r>
+                        <a:rPr lang="en-US" sz="1800" baseline="0" dirty="0" smtClean="0"/>
+                        <a:t>n </a:t>
+                      </a:r>
+                      <a:r>
+                        <a:rPr lang="en-US" sz="1800" baseline="0" dirty="0" err="1" smtClean="0"/>
+                        <a:t>Blatter</a:t>
+                      </a:r>
+                      <a:endParaRPr lang="en-US" sz="1800" dirty="0"/>
+                    </a:p>
+                  </a:txBody>
+                  <a:tcPr/>
+                </a:tc>
+                <a:tc>
+                  <a:txBody>
+                    <a:bodyPr/>
+                    <a:lstStyle/>
+                    <a:p>
+                      <a:r>
+                        <a:rPr lang="en-US" sz="1800" dirty="0" smtClean="0"/>
+                        <a:t>Jack D/</a:t>
+                      </a:r>
+                      <a:r>
+                        <a:rPr lang="en-US" sz="1800" dirty="0" err="1" smtClean="0"/>
+                        <a:t>Aurizio</a:t>
+                      </a:r>
+                      <a:endParaRPr lang="en-US" sz="1800" dirty="0"/>
+                    </a:p>
+                  </a:txBody>
+                  <a:tcPr/>
+                </a:tc>
+                <a:tc>
+                  <a:txBody>
+                    <a:bodyPr/>
+                    <a:lstStyle/>
+                    <a:p>
+                      <a:r>
+                        <a:rPr lang="en-US" sz="1800" dirty="0" err="1" smtClean="0"/>
+                        <a:t>Harasimham</a:t>
+                      </a:r>
+                      <a:endParaRPr lang="en-US" sz="1800" dirty="0"/>
+                    </a:p>
+                  </a:txBody>
+                  <a:tcPr/>
+                </a:tc>
+                <a:tc>
+                  <a:txBody>
+                    <a:bodyPr/>
+                    <a:lstStyle/>
+                    <a:p>
+                      <a:r>
+                        <a:rPr lang="en-US" sz="1800" dirty="0" smtClean="0"/>
+                        <a:t>Robert </a:t>
+                      </a:r>
+                      <a:r>
+                        <a:rPr lang="en-US" sz="1800" dirty="0" err="1" smtClean="0"/>
+                        <a:t>Isreal</a:t>
+                      </a:r>
+                      <a:endParaRPr lang="en-US" sz="1800" dirty="0"/>
+                    </a:p>
+                  </a:txBody>
+                  <a:tcPr/>
+                </a:tc>
+              </a:tr>
+            </a:tbl>
+          </a:graphicData>
+        </a:graphic>
+      </p:graphicFrame>
     </p:spTree>
     <p:extLst>
       <p:ext uri="{BB962C8B-B14F-4D97-AF65-F5344CB8AC3E}">

</xml_diff>

<commit_message>
add TODO for poster (k-means section)
</commit_message>
<xml_diff>
--- a/Poster.pptx
+++ b/Poster.pptx
@@ -3044,7 +3044,7 @@
         <p:spPr>
           <a:xfrm>
             <a:off x="10949201" y="10032870"/>
-            <a:ext cx="10501421" cy="2985433"/>
+            <a:ext cx="10501421" cy="2954655"/>
           </a:xfrm>
           <a:prstGeom prst="rect">
             <a:avLst/>
@@ -3089,7 +3089,19 @@
             </a:r>
             <a:r>
               <a:rPr dirty="0"/>
-              <a:t>means clustering was done using the following features: views, up/down votes, in/out degree, and closeness/eigenvector/PageRank </a:t>
+              <a:t>means clustering was </a:t>
+            </a:r>
+            <a:r>
+              <a:rPr lang="en-US" dirty="0" smtClean="0"/>
+              <a:t>performed, on the User Graph with Geometry tag, </a:t>
+            </a:r>
+            <a:r>
+              <a:rPr dirty="0" smtClean="0"/>
+              <a:t>using </a:t>
+            </a:r>
+            <a:r>
+              <a:rPr dirty="0"/>
+              <a:t>the following features: views, up/down votes, in/out degree, and closeness/eigenvector/PageRank </a:t>
             </a:r>
             <a:r>
               <a:rPr dirty="0" smtClean="0"/>
@@ -3097,7 +3109,7 @@
             </a:r>
             <a:r>
               <a:rPr lang="en-US" dirty="0" smtClean="0"/>
-              <a:t>. TODO what graph are we clustering?</a:t>
+              <a:t>. </a:t>
             </a:r>
             <a:endParaRPr dirty="0"/>
           </a:p>

</xml_diff>

<commit_message>
add references for poster
</commit_message>
<xml_diff>
--- a/Poster.pptx
+++ b/Poster.pptx
@@ -6325,6 +6325,217 @@
           </a:p>
         </p:txBody>
       </p:sp>
+      <p:sp>
+        <p:nvSpPr>
+          <p:cNvPr id="2" name="TextBox 1"/>
+          <p:cNvSpPr txBox="1"/>
+          <p:nvPr/>
+        </p:nvSpPr>
+        <p:spPr>
+          <a:xfrm>
+            <a:off x="13495139" y="28031865"/>
+            <a:ext cx="7955482" cy="3970316"/>
+          </a:xfrm>
+          <a:prstGeom prst="rect">
+            <a:avLst/>
+          </a:prstGeom>
+          <a:noFill/>
+          <a:ln w="12700" cap="flat">
+            <a:noFill/>
+            <a:miter lim="400000"/>
+          </a:ln>
+          <a:effectLst/>
+          <a:sp3d/>
+        </p:spPr>
+        <p:style>
+          <a:lnRef idx="0">
+            <a:scrgbClr r="0" g="0" b="0"/>
+          </a:lnRef>
+          <a:fillRef idx="0">
+            <a:scrgbClr r="0" g="0" b="0"/>
+          </a:fillRef>
+          <a:effectRef idx="0">
+            <a:scrgbClr r="0" g="0" b="0"/>
+          </a:effectRef>
+          <a:fontRef idx="none"/>
+        </p:style>
+        <p:txBody>
+          <a:bodyPr rot="0" spcFirstLastPara="1" vertOverflow="overflow" horzOverflow="overflow" vert="horz" wrap="square" lIns="45719" tIns="45719" rIns="45719" bIns="45719" numCol="1" spcCol="38100" rtlCol="0" anchor="t">
+            <a:spAutoFit/>
+          </a:bodyPr>
+          <a:lstStyle/>
+          <a:p>
+            <a:r>
+              <a:rPr lang="en-US" sz="1800" dirty="0" smtClean="0"/>
+              <a:t>[1] D</a:t>
+            </a:r>
+            <a:r>
+              <a:rPr lang="en-US" sz="1800" dirty="0"/>
+              <a:t>. </a:t>
+            </a:r>
+            <a:r>
+              <a:rPr lang="en-US" sz="1800" dirty="0" err="1"/>
+              <a:t>Movshovitz-Attias</a:t>
+            </a:r>
+            <a:r>
+              <a:rPr lang="en-US" sz="1800" dirty="0"/>
+              <a:t>, Y. </a:t>
+            </a:r>
+            <a:r>
+              <a:rPr lang="en-US" sz="1800" dirty="0" err="1"/>
+              <a:t>Movshovitz-Attias</a:t>
+            </a:r>
+            <a:r>
+              <a:rPr lang="en-US" sz="1800" dirty="0"/>
+              <a:t>, P. </a:t>
+            </a:r>
+            <a:r>
+              <a:rPr lang="en-US" sz="1800" dirty="0" err="1"/>
+              <a:t>Steenkiste</a:t>
+            </a:r>
+            <a:r>
+              <a:rPr lang="en-US" sz="1800" dirty="0"/>
+              <a:t>, and C. </a:t>
+            </a:r>
+            <a:r>
+              <a:rPr lang="en-US" sz="1800" dirty="0" err="1"/>
+              <a:t>Faloutsos</a:t>
+            </a:r>
+            <a:r>
+              <a:rPr lang="en-US" sz="1800" dirty="0"/>
+              <a:t>. “Analysis of the Reputation System and User Contributions on a Question Answering Website: </a:t>
+            </a:r>
+            <a:r>
+              <a:rPr lang="en-US" sz="1800" dirty="0" err="1"/>
+              <a:t>StackOverflow</a:t>
+            </a:r>
+            <a:r>
+              <a:rPr lang="en-US" sz="1800" dirty="0"/>
+              <a:t>.” ASONAM, 2013, pp. 886–893</a:t>
+            </a:r>
+            <a:r>
+              <a:rPr lang="en-US" sz="1800" dirty="0" smtClean="0"/>
+              <a:t>.</a:t>
+            </a:r>
+          </a:p>
+          <a:p>
+            <a:endParaRPr lang="en-US" sz="1800" dirty="0"/>
+          </a:p>
+          <a:p>
+            <a:r>
+              <a:rPr lang="en-US" sz="1800" dirty="0" smtClean="0"/>
+              <a:t>[2] Jun </a:t>
+            </a:r>
+            <a:r>
+              <a:rPr lang="en-US" sz="1800" dirty="0"/>
+              <a:t>Zhang, Mark S. Ackerman, </a:t>
+            </a:r>
+            <a:r>
+              <a:rPr lang="en-US" sz="1800" dirty="0" err="1"/>
+              <a:t>Lada</a:t>
+            </a:r>
+            <a:r>
+              <a:rPr lang="en-US" sz="1800" dirty="0"/>
+              <a:t> </a:t>
+            </a:r>
+            <a:r>
+              <a:rPr lang="en-US" sz="1800" dirty="0" err="1"/>
+              <a:t>Adamic</a:t>
+            </a:r>
+            <a:r>
+              <a:rPr lang="en-US" sz="1800" dirty="0"/>
+              <a:t>. “Expertise Networks in Online Communities: Structure and Algorithms.” 16th International Conference on World Wide Web, May 08-12, 2007, Banff, Alberta, Canada</a:t>
+            </a:r>
+            <a:r>
+              <a:rPr lang="en-US" sz="1800" dirty="0" smtClean="0"/>
+              <a:t>.</a:t>
+            </a:r>
+          </a:p>
+          <a:p>
+            <a:endParaRPr lang="en-US" sz="1800" dirty="0"/>
+          </a:p>
+          <a:p>
+            <a:r>
+              <a:rPr lang="en-US" sz="1800" dirty="0" smtClean="0"/>
+              <a:t>[3] </a:t>
+            </a:r>
+            <a:r>
+              <a:rPr lang="en-US" sz="1800" dirty="0" err="1" smtClean="0"/>
+              <a:t>Lada</a:t>
+            </a:r>
+            <a:r>
+              <a:rPr lang="en-US" sz="1800" dirty="0" smtClean="0"/>
+              <a:t> </a:t>
+            </a:r>
+            <a:r>
+              <a:rPr lang="en-US" sz="1800" dirty="0" err="1"/>
+              <a:t>Adamic</a:t>
+            </a:r>
+            <a:r>
+              <a:rPr lang="en-US" sz="1800" dirty="0"/>
+              <a:t>, Jun Zhang, </a:t>
+            </a:r>
+            <a:r>
+              <a:rPr lang="en-US" sz="1800" dirty="0" err="1"/>
+              <a:t>Eytan</a:t>
+            </a:r>
+            <a:r>
+              <a:rPr lang="en-US" sz="1800" dirty="0"/>
+              <a:t> </a:t>
+            </a:r>
+            <a:r>
+              <a:rPr lang="en-US" sz="1800" dirty="0" err="1"/>
+              <a:t>Bakshy</a:t>
+            </a:r>
+            <a:r>
+              <a:rPr lang="en-US" sz="1800" dirty="0"/>
+              <a:t>, Mark S. Ackerman. “Knowledge Sharing and Yahoo Answers: Everyone Knows Something.” 17th International Conference on World Wide Web, April 21-25, 2008, Beijing, China</a:t>
+            </a:r>
+            <a:r>
+              <a:rPr lang="en-US" sz="1800" dirty="0" smtClean="0"/>
+              <a:t>.</a:t>
+            </a:r>
+          </a:p>
+          <a:p>
+            <a:endParaRPr lang="en-US" sz="1800" dirty="0"/>
+          </a:p>
+          <a:p>
+            <a:r>
+              <a:rPr lang="en-US" sz="1800" dirty="0" smtClean="0"/>
+              <a:t>[4] </a:t>
+            </a:r>
+            <a:r>
+              <a:rPr lang="en-US" sz="1800" dirty="0" err="1" smtClean="0"/>
+              <a:t>StackExchange</a:t>
+            </a:r>
+            <a:r>
+              <a:rPr lang="en-US" sz="1800" dirty="0" smtClean="0"/>
+              <a:t> </a:t>
+            </a:r>
+            <a:r>
+              <a:rPr lang="en-US" sz="1800" dirty="0"/>
+              <a:t>Data Dump (Published August 18, 2015). Retrieved 12 October 2015. https://</a:t>
+            </a:r>
+            <a:r>
+              <a:rPr lang="en-US" sz="1800" dirty="0" err="1"/>
+              <a:t>archive.org</a:t>
+            </a:r>
+            <a:r>
+              <a:rPr lang="en-US" sz="1800" dirty="0"/>
+              <a:t>/details/</a:t>
+            </a:r>
+            <a:r>
+              <a:rPr lang="en-US" sz="1800" dirty="0" err="1"/>
+              <a:t>stackexchange</a:t>
+            </a:r>
+            <a:r>
+              <a:rPr lang="en-US" sz="1800" dirty="0"/>
+              <a:t>.</a:t>
+            </a:r>
+            <a:endParaRPr lang="en-US" sz="1800" dirty="0"/>
+          </a:p>
+        </p:txBody>
+      </p:sp>
     </p:spTree>
   </p:cSld>
   <p:clrMapOvr>

</xml_diff>

<commit_message>
conclusion added to poster
</commit_message>
<xml_diff>
--- a/Poster.pptx
+++ b/Poster.pptx
@@ -6532,7 +6532,102 @@
               <a:rPr lang="en-US" sz="1800" dirty="0"/>
               <a:t>.</a:t>
             </a:r>
-            <a:endParaRPr lang="en-US" sz="1800" dirty="0"/>
+          </a:p>
+        </p:txBody>
+      </p:sp>
+      <p:sp>
+        <p:nvSpPr>
+          <p:cNvPr id="3" name="TextBox 2"/>
+          <p:cNvSpPr txBox="1"/>
+          <p:nvPr/>
+        </p:nvSpPr>
+        <p:spPr>
+          <a:xfrm>
+            <a:off x="366990" y="28158865"/>
+            <a:ext cx="12460010" cy="4339648"/>
+          </a:xfrm>
+          <a:prstGeom prst="rect">
+            <a:avLst/>
+          </a:prstGeom>
+          <a:noFill/>
+          <a:ln w="12700" cap="flat">
+            <a:noFill/>
+            <a:miter lim="400000"/>
+          </a:ln>
+          <a:effectLst/>
+          <a:sp3d/>
+        </p:spPr>
+        <p:style>
+          <a:lnRef idx="0">
+            <a:scrgbClr r="0" g="0" b="0"/>
+          </a:lnRef>
+          <a:fillRef idx="0">
+            <a:scrgbClr r="0" g="0" b="0"/>
+          </a:fillRef>
+          <a:effectRef idx="0">
+            <a:scrgbClr r="0" g="0" b="0"/>
+          </a:effectRef>
+          <a:fontRef idx="none"/>
+        </p:style>
+        <p:txBody>
+          <a:bodyPr rot="0" spcFirstLastPara="1" vertOverflow="overflow" horzOverflow="overflow" vert="horz" wrap="square" lIns="45719" tIns="45719" rIns="45719" bIns="45719" numCol="1" spcCol="38100" rtlCol="0" anchor="t">
+            <a:spAutoFit/>
+          </a:bodyPr>
+          <a:lstStyle/>
+          <a:p>
+            <a:r>
+              <a:rPr lang="en-US" sz="3000" dirty="0"/>
+              <a:t>The results from the k-means clustering </a:t>
+            </a:r>
+            <a:r>
+              <a:rPr lang="en-US" sz="3000" dirty="0" smtClean="0"/>
+              <a:t>indicate that </a:t>
+            </a:r>
+            <a:r>
+              <a:rPr lang="en-US" sz="3000" dirty="0"/>
+              <a:t>there is a strong contingent of one type of user (the causal question asker/answerer), and a small contingent of the expert users. </a:t>
+            </a:r>
+            <a:endParaRPr lang="en-US" sz="3000" dirty="0" smtClean="0"/>
+          </a:p>
+          <a:p>
+            <a:endParaRPr lang="en-US" sz="3000" dirty="0"/>
+          </a:p>
+          <a:p>
+            <a:r>
+              <a:rPr lang="en-US" sz="3200" dirty="0" smtClean="0"/>
+              <a:t>Our </a:t>
+            </a:r>
+            <a:r>
+              <a:rPr lang="en-US" sz="3200" dirty="0"/>
+              <a:t>heuristic analysis showed both feasibility and actual results with regard to the task of predicting and evaluating domain expertise using a data-driven approach that draws from the question-answer graph model.</a:t>
+            </a:r>
+            <a:endParaRPr lang="en-US" sz="3000" dirty="0" smtClean="0"/>
+          </a:p>
+          <a:p>
+            <a:endParaRPr kumimoji="0" lang="en-US" sz="3000" b="0" i="0" u="none" strike="noStrike" cap="none" spc="0" normalizeH="0" baseline="0" dirty="0">
+              <a:ln>
+                <a:noFill/>
+              </a:ln>
+              <a:solidFill>
+                <a:srgbClr val="000000"/>
+              </a:solidFill>
+              <a:effectLst/>
+              <a:uFillTx/>
+              <a:sym typeface="Calibri"/>
+            </a:endParaRPr>
+          </a:p>
+          <a:p>
+            <a:endParaRPr kumimoji="0" lang="en-US" sz="3000" b="0" i="0" u="none" strike="noStrike" cap="none" spc="0" normalizeH="0" baseline="0" dirty="0">
+              <a:ln>
+                <a:noFill/>
+              </a:ln>
+              <a:solidFill>
+                <a:srgbClr val="000000"/>
+              </a:solidFill>
+              <a:effectLst/>
+              <a:uFillTx/>
+              <a:sym typeface="Calibri"/>
+            </a:endParaRPr>
           </a:p>
         </p:txBody>
       </p:sp>

</xml_diff>